<commit_message>
updated slides (described LDA, expanded later part, and cleaned up).  Still not fully done though
</commit_message>
<xml_diff>
--- a/BMML_Presentation.pptx
+++ b/BMML_Presentation.pptx
@@ -8,16 +8,17 @@
     <p:sldId id="256" r:id="rId2"/>
     <p:sldId id="257" r:id="rId3"/>
     <p:sldId id="260" r:id="rId4"/>
-    <p:sldId id="261" r:id="rId5"/>
-    <p:sldId id="264" r:id="rId6"/>
-    <p:sldId id="258" r:id="rId7"/>
-    <p:sldId id="262" r:id="rId8"/>
-    <p:sldId id="259" r:id="rId9"/>
-    <p:sldId id="265" r:id="rId10"/>
-    <p:sldId id="266" r:id="rId11"/>
-    <p:sldId id="267" r:id="rId12"/>
-    <p:sldId id="268" r:id="rId13"/>
-    <p:sldId id="263" r:id="rId14"/>
+    <p:sldId id="264" r:id="rId5"/>
+    <p:sldId id="269" r:id="rId6"/>
+    <p:sldId id="261" r:id="rId7"/>
+    <p:sldId id="258" r:id="rId8"/>
+    <p:sldId id="262" r:id="rId9"/>
+    <p:sldId id="259" r:id="rId10"/>
+    <p:sldId id="268" r:id="rId11"/>
+    <p:sldId id="265" r:id="rId12"/>
+    <p:sldId id="266" r:id="rId13"/>
+    <p:sldId id="267" r:id="rId14"/>
+    <p:sldId id="263" r:id="rId15"/>
   </p:sldIdLst>
   <p:sldSz cx="9144000" cy="6858000" type="screen4x3"/>
   <p:notesSz cx="6858000" cy="9144000"/>
@@ -3533,7 +3534,15 @@
           <a:p>
             <a:r>
               <a:rPr lang="en-US" dirty="0" smtClean="0"/>
-              <a:t>HDP…</a:t>
+              <a:t>LDA </a:t>
+            </a:r>
+            <a:r>
+              <a:rPr lang="en-US" dirty="0" err="1" smtClean="0"/>
+              <a:t>vs</a:t>
+            </a:r>
+            <a:r>
+              <a:rPr lang="en-US" dirty="0" smtClean="0"/>
+              <a:t> NMF</a:t>
             </a:r>
             <a:endParaRPr lang="en-US" dirty="0"/>
           </a:p>
@@ -3541,18 +3550,217 @@
       </p:sp>
       <p:sp>
         <p:nvSpPr>
-          <p:cNvPr id="3" name="Content Placeholder 2"/>
-          <p:cNvSpPr>
-            <a:spLocks noGrp="1"/>
-          </p:cNvSpPr>
-          <p:nvPr>
-            <p:ph idx="1"/>
-          </p:nvPr>
-        </p:nvSpPr>
-        <p:spPr/>
-        <p:txBody>
-          <a:bodyPr/>
-          <a:lstStyle/>
+          <p:cNvPr id="5" name="Content Placeholder 2"/>
+          <p:cNvSpPr txBox="1">
+            <a:spLocks/>
+          </p:cNvSpPr>
+          <p:nvPr/>
+        </p:nvSpPr>
+        <p:spPr>
+          <a:xfrm>
+            <a:off x="457200" y="1600200"/>
+            <a:ext cx="8229600" cy="4876800"/>
+          </a:xfrm>
+          <a:prstGeom prst="rect">
+            <a:avLst/>
+          </a:prstGeom>
+        </p:spPr>
+        <p:txBody>
+          <a:bodyPr/>
+          <a:lstStyle>
+            <a:lvl1pPr marL="182880" indent="-182880" algn="l" defTabSz="914400" rtl="0" eaLnBrk="1" latinLnBrk="0" hangingPunct="1">
+              <a:spcBef>
+                <a:spcPct val="20000"/>
+              </a:spcBef>
+              <a:buClr>
+                <a:schemeClr val="accent1"/>
+              </a:buClr>
+              <a:buSzPct val="85000"/>
+              <a:buFont typeface="Arial" pitchFamily="34" charset="0"/>
+              <a:buChar char="•"/>
+              <a:defRPr sz="2400" kern="1200">
+                <a:solidFill>
+                  <a:schemeClr val="tx1"/>
+                </a:solidFill>
+                <a:latin typeface="+mn-lt"/>
+                <a:ea typeface="+mn-ea"/>
+                <a:cs typeface="+mn-cs"/>
+              </a:defRPr>
+            </a:lvl1pPr>
+            <a:lvl2pPr marL="457200" indent="-182880" algn="l" defTabSz="914400" rtl="0" eaLnBrk="1" latinLnBrk="0" hangingPunct="1">
+              <a:spcBef>
+                <a:spcPct val="20000"/>
+              </a:spcBef>
+              <a:buClr>
+                <a:schemeClr val="accent1"/>
+              </a:buClr>
+              <a:buSzPct val="85000"/>
+              <a:buFont typeface="Arial" pitchFamily="34" charset="0"/>
+              <a:buChar char="•"/>
+              <a:defRPr sz="2000" kern="1200">
+                <a:solidFill>
+                  <a:schemeClr val="tx1"/>
+                </a:solidFill>
+                <a:latin typeface="+mn-lt"/>
+                <a:ea typeface="+mn-ea"/>
+                <a:cs typeface="+mn-cs"/>
+              </a:defRPr>
+            </a:lvl2pPr>
+            <a:lvl3pPr marL="731520" indent="-182880" algn="l" defTabSz="914400" rtl="0" eaLnBrk="1" latinLnBrk="0" hangingPunct="1">
+              <a:spcBef>
+                <a:spcPct val="20000"/>
+              </a:spcBef>
+              <a:buClr>
+                <a:schemeClr val="accent1"/>
+              </a:buClr>
+              <a:buSzPct val="90000"/>
+              <a:buFont typeface="Arial" pitchFamily="34" charset="0"/>
+              <a:buChar char="•"/>
+              <a:defRPr sz="1800" kern="1200">
+                <a:solidFill>
+                  <a:schemeClr val="tx1"/>
+                </a:solidFill>
+                <a:latin typeface="+mn-lt"/>
+                <a:ea typeface="+mn-ea"/>
+                <a:cs typeface="+mn-cs"/>
+              </a:defRPr>
+            </a:lvl3pPr>
+            <a:lvl4pPr marL="1005840" indent="-182880" algn="l" defTabSz="914400" rtl="0" eaLnBrk="1" latinLnBrk="0" hangingPunct="1">
+              <a:spcBef>
+                <a:spcPct val="20000"/>
+              </a:spcBef>
+              <a:buClr>
+                <a:schemeClr val="accent1"/>
+              </a:buClr>
+              <a:buFont typeface="Arial" pitchFamily="34" charset="0"/>
+              <a:buChar char="•"/>
+              <a:defRPr sz="1600" kern="1200">
+                <a:solidFill>
+                  <a:schemeClr val="tx1"/>
+                </a:solidFill>
+                <a:latin typeface="+mn-lt"/>
+                <a:ea typeface="+mn-ea"/>
+                <a:cs typeface="+mn-cs"/>
+              </a:defRPr>
+            </a:lvl4pPr>
+            <a:lvl5pPr marL="1188720" indent="-137160" algn="l" defTabSz="914400" rtl="0" eaLnBrk="1" latinLnBrk="0" hangingPunct="1">
+              <a:spcBef>
+                <a:spcPct val="20000"/>
+              </a:spcBef>
+              <a:buClr>
+                <a:schemeClr val="accent1"/>
+              </a:buClr>
+              <a:buSzPct val="100000"/>
+              <a:buFont typeface="Arial" pitchFamily="34" charset="0"/>
+              <a:buChar char="•"/>
+              <a:defRPr sz="1400" kern="1200" baseline="0">
+                <a:solidFill>
+                  <a:schemeClr val="tx1"/>
+                </a:solidFill>
+                <a:latin typeface="+mn-lt"/>
+                <a:ea typeface="+mn-ea"/>
+                <a:cs typeface="+mn-cs"/>
+              </a:defRPr>
+            </a:lvl5pPr>
+            <a:lvl6pPr marL="1371600" indent="-182880" algn="l" defTabSz="914400" rtl="0" eaLnBrk="1" latinLnBrk="0" hangingPunct="1">
+              <a:spcBef>
+                <a:spcPct val="20000"/>
+              </a:spcBef>
+              <a:buClr>
+                <a:schemeClr val="accent1"/>
+              </a:buClr>
+              <a:buFont typeface="Arial" pitchFamily="34" charset="0"/>
+              <a:buChar char="•"/>
+              <a:defRPr sz="1300" kern="1200">
+                <a:solidFill>
+                  <a:schemeClr val="tx1"/>
+                </a:solidFill>
+                <a:latin typeface="+mn-lt"/>
+                <a:ea typeface="+mn-ea"/>
+                <a:cs typeface="+mn-cs"/>
+              </a:defRPr>
+            </a:lvl6pPr>
+            <a:lvl7pPr marL="1554480" indent="-182880" algn="l" defTabSz="914400" rtl="0" eaLnBrk="1" latinLnBrk="0" hangingPunct="1">
+              <a:spcBef>
+                <a:spcPct val="20000"/>
+              </a:spcBef>
+              <a:buClr>
+                <a:schemeClr val="accent1"/>
+              </a:buClr>
+              <a:buFont typeface="Arial" pitchFamily="34" charset="0"/>
+              <a:buChar char="•"/>
+              <a:defRPr sz="1300" kern="1200">
+                <a:solidFill>
+                  <a:schemeClr val="tx1"/>
+                </a:solidFill>
+                <a:latin typeface="+mn-lt"/>
+                <a:ea typeface="+mn-ea"/>
+                <a:cs typeface="+mn-cs"/>
+              </a:defRPr>
+            </a:lvl7pPr>
+            <a:lvl8pPr marL="1737360" indent="-182880" algn="l" defTabSz="914400" rtl="0" eaLnBrk="1" latinLnBrk="0" hangingPunct="1">
+              <a:spcBef>
+                <a:spcPct val="20000"/>
+              </a:spcBef>
+              <a:buClr>
+                <a:schemeClr val="accent1"/>
+              </a:buClr>
+              <a:buFont typeface="Arial" pitchFamily="34" charset="0"/>
+              <a:buChar char="•"/>
+              <a:defRPr sz="1300" kern="1200">
+                <a:solidFill>
+                  <a:schemeClr val="tx1"/>
+                </a:solidFill>
+                <a:latin typeface="+mn-lt"/>
+                <a:ea typeface="+mn-ea"/>
+                <a:cs typeface="+mn-cs"/>
+              </a:defRPr>
+            </a:lvl8pPr>
+            <a:lvl9pPr marL="1920240" indent="-182880" algn="l" defTabSz="914400" rtl="0" eaLnBrk="1" latinLnBrk="0" hangingPunct="1">
+              <a:spcBef>
+                <a:spcPct val="20000"/>
+              </a:spcBef>
+              <a:buClr>
+                <a:schemeClr val="accent1"/>
+              </a:buClr>
+              <a:buFont typeface="Arial" pitchFamily="34" charset="0"/>
+              <a:buChar char="•"/>
+              <a:defRPr sz="1300" kern="1200">
+                <a:solidFill>
+                  <a:schemeClr val="tx1"/>
+                </a:solidFill>
+                <a:latin typeface="+mn-lt"/>
+                <a:ea typeface="+mn-ea"/>
+                <a:cs typeface="+mn-cs"/>
+              </a:defRPr>
+            </a:lvl9pPr>
+          </a:lstStyle>
+          <a:p>
+            <a:r>
+              <a:rPr lang="en-US" dirty="0" smtClean="0"/>
+              <a:t>NMF faster, of course</a:t>
+            </a:r>
+          </a:p>
+          <a:p>
+            <a:r>
+              <a:rPr lang="en-US" dirty="0" smtClean="0"/>
+              <a:t>NMF (particularly with the right representation of corpus—TF-IDF) seems to produce more coherent topics?</a:t>
+            </a:r>
+          </a:p>
+          <a:p>
+            <a:pPr lvl="1"/>
+            <a:r>
+              <a:rPr lang="en-US" dirty="0" smtClean="0"/>
+              <a:t>LDA (depending on representation of corpus) can produce fine or very poor topics</a:t>
+            </a:r>
+          </a:p>
+          <a:p>
+            <a:pPr lvl="1"/>
+            <a:r>
+              <a:rPr lang="en-US" dirty="0" smtClean="0"/>
+              <a:t>Probably a problem on our end</a:t>
+            </a:r>
+          </a:p>
           <a:p>
             <a:endParaRPr lang="en-US" dirty="0" smtClean="0"/>
           </a:p>
@@ -3561,20 +3769,13 @@
     </p:spTree>
     <p:extLst>
       <p:ext uri="{BB962C8B-B14F-4D97-AF65-F5344CB8AC3E}">
-        <p14:creationId xmlns:p14="http://schemas.microsoft.com/office/powerpoint/2010/main" val="4066006703"/>
+        <p14:creationId xmlns:p14="http://schemas.microsoft.com/office/powerpoint/2010/main" val="992791850"/>
       </p:ext>
     </p:extLst>
   </p:cSld>
   <p:clrMapOvr>
     <a:masterClrMapping/>
   </p:clrMapOvr>
-  <p:timing>
-    <p:tnLst>
-      <p:par>
-        <p:cTn xmlns:p14="http://schemas.microsoft.com/office/powerpoint/2010/main" id="1" dur="indefinite" restart="never" nodeType="tmRoot"/>
-      </p:par>
-    </p:tnLst>
-  </p:timing>
 </p:sld>
 </file>
 
@@ -3607,59 +3808,21 @@
         </p:nvSpPr>
         <p:spPr/>
         <p:txBody>
-          <a:bodyPr>
-            <a:normAutofit fontScale="90000"/>
-          </a:bodyPr>
-          <a:lstStyle/>
-          <a:p>
-            <a:r>
-              <a:rPr lang="en-US" dirty="0" smtClean="0"/>
-              <a:t>Using LDA Topic-Distributions as Features</a:t>
+          <a:bodyPr/>
+          <a:lstStyle/>
+          <a:p>
+            <a:r>
+              <a:rPr lang="en-US" dirty="0" smtClean="0"/>
+              <a:t>Methods for setting number of topics</a:t>
             </a:r>
             <a:endParaRPr lang="en-US" dirty="0"/>
-          </a:p>
-        </p:txBody>
-      </p:sp>
-      <p:sp>
-        <p:nvSpPr>
-          <p:cNvPr id="3" name="Content Placeholder 2"/>
-          <p:cNvSpPr>
-            <a:spLocks noGrp="1"/>
-          </p:cNvSpPr>
-          <p:nvPr>
-            <p:ph idx="1"/>
-          </p:nvPr>
-        </p:nvSpPr>
-        <p:spPr/>
-        <p:txBody>
-          <a:bodyPr/>
-          <a:lstStyle/>
-          <a:p>
-            <a:r>
-              <a:rPr lang="en-US" dirty="0" smtClean="0"/>
-              <a:t>How does topic count affect accuracy of classifiers?</a:t>
-            </a:r>
-          </a:p>
-          <a:p>
-            <a:r>
-              <a:rPr lang="en-US" dirty="0" smtClean="0"/>
-              <a:t>How does this relate to other methods of </a:t>
-            </a:r>
-            <a:r>
-              <a:rPr lang="en-US" dirty="0" err="1" smtClean="0"/>
-              <a:t>determiniing</a:t>
-            </a:r>
-            <a:r>
-              <a:rPr lang="en-US" dirty="0" smtClean="0"/>
-              <a:t> ideal topic count?</a:t>
-            </a:r>
           </a:p>
         </p:txBody>
       </p:sp>
     </p:spTree>
     <p:extLst>
       <p:ext uri="{BB962C8B-B14F-4D97-AF65-F5344CB8AC3E}">
-        <p14:creationId xmlns:p14="http://schemas.microsoft.com/office/powerpoint/2010/main" val="4066006703"/>
+        <p14:creationId xmlns:p14="http://schemas.microsoft.com/office/powerpoint/2010/main" val="2355179620"/>
       </p:ext>
     </p:extLst>
   </p:cSld>
@@ -3705,12 +3868,14 @@
         </p:nvSpPr>
         <p:spPr/>
         <p:txBody>
-          <a:bodyPr/>
-          <a:lstStyle/>
-          <a:p>
-            <a:r>
-              <a:rPr lang="en-US" dirty="0" smtClean="0"/>
-              <a:t>Our progress so far…</a:t>
+          <a:bodyPr>
+            <a:normAutofit/>
+          </a:bodyPr>
+          <a:lstStyle/>
+          <a:p>
+            <a:r>
+              <a:rPr lang="en-US" dirty="0" smtClean="0"/>
+              <a:t>Different possible approaches</a:t>
             </a:r>
             <a:endParaRPr lang="en-US" dirty="0"/>
           </a:p>
@@ -3731,6 +3896,28 @@
           <a:bodyPr/>
           <a:lstStyle/>
           <a:p>
+            <a:r>
+              <a:rPr lang="en-US" dirty="0" smtClean="0"/>
+              <a:t>Compare different numbers of topics and see what the log likelihood of the data is</a:t>
+            </a:r>
+          </a:p>
+          <a:p>
+            <a:r>
+              <a:rPr lang="en-US" dirty="0" smtClean="0"/>
+              <a:t>Hierarchical </a:t>
+            </a:r>
+            <a:r>
+              <a:rPr lang="en-US" dirty="0" err="1" smtClean="0"/>
+              <a:t>Dirichlet</a:t>
+            </a:r>
+            <a:r>
+              <a:rPr lang="en-US" dirty="0" smtClean="0"/>
+              <a:t> processes (investigating)</a:t>
+            </a:r>
+            <a:r>
+              <a:rPr lang="en-US" dirty="0" smtClean="0"/>
+              <a:t> </a:t>
+            </a:r>
             <a:endParaRPr lang="en-US" dirty="0" smtClean="0"/>
           </a:p>
         </p:txBody>
@@ -3738,7 +3925,7 @@
     </p:spTree>
     <p:extLst>
       <p:ext uri="{BB962C8B-B14F-4D97-AF65-F5344CB8AC3E}">
-        <p14:creationId xmlns:p14="http://schemas.microsoft.com/office/powerpoint/2010/main" val="826477111"/>
+        <p14:creationId xmlns:p14="http://schemas.microsoft.com/office/powerpoint/2010/main" val="4066006703"/>
       </p:ext>
     </p:extLst>
   </p:cSld>
@@ -3756,6 +3943,185 @@
 </file>
 
 <file path=ppt/slides/slide13.xml><?xml version="1.0" encoding="utf-8"?>
+<p:sld xmlns:a="http://schemas.openxmlformats.org/drawingml/2006/main" xmlns:r="http://schemas.openxmlformats.org/officeDocument/2006/relationships" xmlns:p="http://schemas.openxmlformats.org/presentationml/2006/main">
+  <p:cSld>
+    <p:spTree>
+      <p:nvGrpSpPr>
+        <p:cNvPr id="1" name=""/>
+        <p:cNvGrpSpPr/>
+        <p:nvPr/>
+      </p:nvGrpSpPr>
+      <p:grpSpPr>
+        <a:xfrm>
+          <a:off x="0" y="0"/>
+          <a:ext cx="0" cy="0"/>
+          <a:chOff x="0" y="0"/>
+          <a:chExt cx="0" cy="0"/>
+        </a:xfrm>
+      </p:grpSpPr>
+      <p:sp>
+        <p:nvSpPr>
+          <p:cNvPr id="2" name="Title 1"/>
+          <p:cNvSpPr>
+            <a:spLocks noGrp="1"/>
+          </p:cNvSpPr>
+          <p:nvPr>
+            <p:ph type="title"/>
+          </p:nvPr>
+        </p:nvSpPr>
+        <p:spPr/>
+        <p:txBody>
+          <a:bodyPr>
+            <a:normAutofit/>
+          </a:bodyPr>
+          <a:lstStyle/>
+          <a:p>
+            <a:r>
+              <a:rPr lang="en-US" dirty="0" smtClean="0"/>
+              <a:t>LDA for document classification</a:t>
+            </a:r>
+            <a:endParaRPr lang="en-US" dirty="0"/>
+          </a:p>
+        </p:txBody>
+      </p:sp>
+      <p:sp>
+        <p:nvSpPr>
+          <p:cNvPr id="3" name="Content Placeholder 2"/>
+          <p:cNvSpPr>
+            <a:spLocks noGrp="1"/>
+          </p:cNvSpPr>
+          <p:nvPr>
+            <p:ph idx="1"/>
+          </p:nvPr>
+        </p:nvSpPr>
+        <p:spPr/>
+        <p:txBody>
+          <a:bodyPr/>
+          <a:lstStyle/>
+          <a:p>
+            <a:r>
+              <a:rPr lang="en-US" dirty="0" smtClean="0"/>
+              <a:t>Train a machine learning classifier using distributions over topics as features for each document (</a:t>
+            </a:r>
+            <a:r>
+              <a:rPr lang="en-US" dirty="0" err="1" smtClean="0"/>
+              <a:t>Blei</a:t>
+            </a:r>
+            <a:r>
+              <a:rPr lang="en-US" dirty="0" smtClean="0"/>
+              <a:t> et al, 2003)</a:t>
+            </a:r>
+          </a:p>
+          <a:p>
+            <a:pPr lvl="1"/>
+            <a:r>
+              <a:rPr lang="en-US" dirty="0" smtClean="0"/>
+              <a:t>Much lower dimensional</a:t>
+            </a:r>
+          </a:p>
+          <a:p>
+            <a:pPr lvl="1"/>
+            <a:r>
+              <a:rPr lang="en-US" dirty="0" smtClean="0"/>
+              <a:t>Currently, as mentioned, our topics have quality issues (bug?) so our classifier doesn’t perform well</a:t>
+            </a:r>
+          </a:p>
+          <a:p>
+            <a:pPr marL="274320" lvl="1" indent="0">
+              <a:buNone/>
+            </a:pPr>
+            <a:endParaRPr lang="en-US" dirty="0" smtClean="0"/>
+          </a:p>
+          <a:p>
+            <a:r>
+              <a:rPr lang="en-US" dirty="0" smtClean="0"/>
+              <a:t>How </a:t>
+            </a:r>
+            <a:r>
+              <a:rPr lang="en-US" dirty="0" smtClean="0"/>
+              <a:t>does topic count affect accuracy of classifiers</a:t>
+            </a:r>
+            <a:r>
+              <a:rPr lang="en-US" dirty="0" smtClean="0"/>
+              <a:t>?</a:t>
+            </a:r>
+          </a:p>
+          <a:p>
+            <a:pPr lvl="1"/>
+            <a:r>
+              <a:rPr lang="en-US" dirty="0" smtClean="0"/>
+              <a:t>Too few topics </a:t>
+            </a:r>
+            <a:r>
+              <a:rPr lang="en-US" dirty="0" smtClean="0">
+                <a:sym typeface="Wingdings"/>
+              </a:rPr>
+              <a:t></a:t>
+            </a:r>
+            <a:r>
+              <a:rPr lang="en-US" dirty="0" smtClean="0"/>
+              <a:t> not enough features</a:t>
+            </a:r>
+          </a:p>
+          <a:p>
+            <a:pPr lvl="1"/>
+            <a:r>
+              <a:rPr lang="en-US" dirty="0" smtClean="0"/>
+              <a:t>Too many </a:t>
+            </a:r>
+            <a:r>
+              <a:rPr lang="en-US" dirty="0" smtClean="0">
+                <a:sym typeface="Wingdings"/>
+              </a:rPr>
+              <a:t> </a:t>
+            </a:r>
+            <a:r>
+              <a:rPr lang="en-US" dirty="0" err="1" smtClean="0"/>
+              <a:t>overfit</a:t>
+            </a:r>
+            <a:endParaRPr lang="en-US" dirty="0" smtClean="0"/>
+          </a:p>
+          <a:p>
+            <a:pPr lvl="1"/>
+            <a:endParaRPr lang="en-US" dirty="0" smtClean="0"/>
+          </a:p>
+          <a:p>
+            <a:r>
+              <a:rPr lang="en-US" dirty="0" smtClean="0"/>
+              <a:t>How does this relate to other methods of </a:t>
+            </a:r>
+            <a:r>
+              <a:rPr lang="en-US" dirty="0" smtClean="0"/>
+              <a:t>determining </a:t>
+            </a:r>
+            <a:r>
+              <a:rPr lang="en-US" dirty="0" smtClean="0"/>
+              <a:t>ideal topic count?</a:t>
+            </a:r>
+          </a:p>
+        </p:txBody>
+      </p:sp>
+    </p:spTree>
+    <p:extLst>
+      <p:ext uri="{BB962C8B-B14F-4D97-AF65-F5344CB8AC3E}">
+        <p14:creationId xmlns:p14="http://schemas.microsoft.com/office/powerpoint/2010/main" val="4066006703"/>
+      </p:ext>
+    </p:extLst>
+  </p:cSld>
+  <p:clrMapOvr>
+    <a:masterClrMapping/>
+  </p:clrMapOvr>
+  <p:timing>
+    <p:tnLst>
+      <p:par>
+        <p:cTn xmlns:p14="http://schemas.microsoft.com/office/powerpoint/2010/main" id="1" dur="indefinite" restart="never" nodeType="tmRoot"/>
+      </p:par>
+    </p:tnLst>
+  </p:timing>
+</p:sld>
+</file>
+
+<file path=ppt/slides/slide14.xml><?xml version="1.0" encoding="utf-8"?>
 <p:sld xmlns:a="http://schemas.openxmlformats.org/drawingml/2006/main" xmlns:r="http://schemas.openxmlformats.org/officeDocument/2006/relationships" xmlns:p="http://schemas.openxmlformats.org/presentationml/2006/main">
   <p:cSld>
     <p:spTree>
@@ -3877,37 +4243,28 @@
           <a:p>
             <a:r>
               <a:rPr lang="en-US" sz="3600" dirty="0" smtClean="0"/>
-              <a:t>Topics</a:t>
+              <a:t>Topic Modeling</a:t>
             </a:r>
             <a:endParaRPr lang="en-US" sz="3600" dirty="0"/>
           </a:p>
           <a:p>
             <a:r>
               <a:rPr lang="en-US" sz="3600" dirty="0" smtClean="0"/>
-              <a:t>LDA</a:t>
+              <a:t>Comparison of techniques</a:t>
             </a:r>
             <a:endParaRPr lang="en-US" sz="3600" dirty="0"/>
           </a:p>
           <a:p>
             <a:r>
               <a:rPr lang="en-US" sz="3600" dirty="0" smtClean="0"/>
-              <a:t>NMF</a:t>
-            </a:r>
-          </a:p>
-          <a:p>
-            <a:r>
-              <a:rPr lang="en-US" sz="3600" dirty="0" smtClean="0"/>
-              <a:t>HDP</a:t>
-            </a:r>
-          </a:p>
-          <a:p>
-            <a:r>
-              <a:rPr lang="en-US" sz="3600" dirty="0" smtClean="0"/>
-              <a:t>Results</a:t>
+              <a:t>Determining number of topics</a:t>
             </a:r>
             <a:endParaRPr lang="en-US" sz="3600" dirty="0" smtClean="0"/>
           </a:p>
           <a:p>
+            <a:pPr marL="0" indent="0">
+              <a:buNone/>
+            </a:pPr>
             <a:endParaRPr lang="en-US" dirty="0" smtClean="0"/>
           </a:p>
         </p:txBody>
@@ -3966,11 +4323,7 @@
           <a:p>
             <a:r>
               <a:rPr lang="en-US" dirty="0" smtClean="0"/>
-              <a:t>An Introduction to </a:t>
-            </a:r>
-            <a:r>
-              <a:rPr lang="en-US" dirty="0" smtClean="0"/>
-              <a:t>topic modeling</a:t>
+              <a:t>An Introduction to topic modeling</a:t>
             </a:r>
             <a:endParaRPr lang="en-US" dirty="0"/>
           </a:p>
@@ -3997,88 +4350,6 @@
 </file>
 
 <file path=ppt/slides/slide4.xml><?xml version="1.0" encoding="utf-8"?>
-<p:sld xmlns:a="http://schemas.openxmlformats.org/drawingml/2006/main" xmlns:r="http://schemas.openxmlformats.org/officeDocument/2006/relationships" xmlns:p="http://schemas.openxmlformats.org/presentationml/2006/main">
-  <p:cSld>
-    <p:spTree>
-      <p:nvGrpSpPr>
-        <p:cNvPr id="1" name=""/>
-        <p:cNvGrpSpPr/>
-        <p:nvPr/>
-      </p:nvGrpSpPr>
-      <p:grpSpPr>
-        <a:xfrm>
-          <a:off x="0" y="0"/>
-          <a:ext cx="0" cy="0"/>
-          <a:chOff x="0" y="0"/>
-          <a:chExt cx="0" cy="0"/>
-        </a:xfrm>
-      </p:grpSpPr>
-      <p:sp>
-        <p:nvSpPr>
-          <p:cNvPr id="2" name="Title 1"/>
-          <p:cNvSpPr>
-            <a:spLocks noGrp="1"/>
-          </p:cNvSpPr>
-          <p:nvPr>
-            <p:ph type="title"/>
-          </p:nvPr>
-        </p:nvSpPr>
-        <p:spPr/>
-        <p:txBody>
-          <a:bodyPr/>
-          <a:lstStyle/>
-          <a:p>
-            <a:r>
-              <a:rPr lang="en-US" dirty="0" smtClean="0"/>
-              <a:t>Term-Document Matrix</a:t>
-            </a:r>
-            <a:endParaRPr lang="en-US" dirty="0"/>
-          </a:p>
-        </p:txBody>
-      </p:sp>
-      <p:pic>
-        <p:nvPicPr>
-          <p:cNvPr id="5" name="Content Placeholder 4"/>
-          <p:cNvPicPr>
-            <a:picLocks noGrp="1" noChangeAspect="1"/>
-          </p:cNvPicPr>
-          <p:nvPr>
-            <p:ph idx="1"/>
-          </p:nvPr>
-        </p:nvPicPr>
-        <p:blipFill rotWithShape="1">
-          <a:blip r:embed="rId2"/>
-          <a:srcRect l="2741" t="5402" r="2142" b="5436"/>
-          <a:stretch/>
-        </p:blipFill>
-        <p:spPr>
-          <a:xfrm>
-            <a:off x="657141" y="1709496"/>
-            <a:ext cx="7883920" cy="4511753"/>
-          </a:xfrm>
-        </p:spPr>
-      </p:pic>
-    </p:spTree>
-    <p:extLst>
-      <p:ext uri="{BB962C8B-B14F-4D97-AF65-F5344CB8AC3E}">
-        <p14:creationId xmlns:p14="http://schemas.microsoft.com/office/powerpoint/2010/main" val="1386330539"/>
-      </p:ext>
-    </p:extLst>
-  </p:cSld>
-  <p:clrMapOvr>
-    <a:masterClrMapping/>
-  </p:clrMapOvr>
-  <p:timing>
-    <p:tnLst>
-      <p:par>
-        <p:cTn xmlns:p14="http://schemas.microsoft.com/office/powerpoint/2010/main" id="1" dur="indefinite" restart="never" nodeType="tmRoot"/>
-      </p:par>
-    </p:tnLst>
-  </p:timing>
-</p:sld>
-</file>
-
-<file path=ppt/slides/slide5.xml><?xml version="1.0" encoding="utf-8"?>
 <p:sld xmlns:a="http://schemas.openxmlformats.org/drawingml/2006/main" xmlns:r="http://schemas.openxmlformats.org/officeDocument/2006/relationships" xmlns:p="http://schemas.openxmlformats.org/presentationml/2006/main">
   <p:cSld>
     <p:spTree>
@@ -4202,6 +4473,435 @@
 </p:sld>
 </file>
 
+<file path=ppt/slides/slide5.xml><?xml version="1.0" encoding="utf-8"?>
+<p:sld xmlns:a="http://schemas.openxmlformats.org/drawingml/2006/main" xmlns:r="http://schemas.openxmlformats.org/officeDocument/2006/relationships" xmlns:p="http://schemas.openxmlformats.org/presentationml/2006/main">
+  <p:cSld>
+    <p:spTree>
+      <p:nvGrpSpPr>
+        <p:cNvPr id="1" name=""/>
+        <p:cNvGrpSpPr/>
+        <p:nvPr/>
+      </p:nvGrpSpPr>
+      <p:grpSpPr>
+        <a:xfrm>
+          <a:off x="0" y="0"/>
+          <a:ext cx="0" cy="0"/>
+          <a:chOff x="0" y="0"/>
+          <a:chExt cx="0" cy="0"/>
+        </a:xfrm>
+      </p:grpSpPr>
+      <p:sp>
+        <p:nvSpPr>
+          <p:cNvPr id="2" name="Title 1"/>
+          <p:cNvSpPr>
+            <a:spLocks noGrp="1"/>
+          </p:cNvSpPr>
+          <p:nvPr>
+            <p:ph type="title"/>
+          </p:nvPr>
+        </p:nvSpPr>
+        <p:spPr/>
+        <p:txBody>
+          <a:bodyPr/>
+          <a:lstStyle/>
+          <a:p>
+            <a:r>
+              <a:rPr lang="en-US" dirty="0" smtClean="0"/>
+              <a:t>Representing data</a:t>
+            </a:r>
+            <a:endParaRPr lang="en-US" dirty="0"/>
+          </a:p>
+        </p:txBody>
+      </p:sp>
+      <p:sp>
+        <p:nvSpPr>
+          <p:cNvPr id="3" name="Content Placeholder 2"/>
+          <p:cNvSpPr>
+            <a:spLocks noGrp="1"/>
+          </p:cNvSpPr>
+          <p:nvPr>
+            <p:ph idx="1"/>
+          </p:nvPr>
+        </p:nvSpPr>
+        <p:spPr/>
+        <p:txBody>
+          <a:bodyPr/>
+          <a:lstStyle/>
+          <a:p>
+            <a:r>
+              <a:rPr lang="en-US" dirty="0" smtClean="0"/>
+              <a:t>Consider corpus:</a:t>
+            </a:r>
+          </a:p>
+          <a:p>
+            <a:pPr lvl="1"/>
+            <a:r>
+              <a:rPr lang="en-US" dirty="0" smtClean="0"/>
+              <a:t>“Business is business.”</a:t>
+            </a:r>
+          </a:p>
+          <a:p>
+            <a:pPr lvl="1"/>
+            <a:r>
+              <a:rPr lang="en-US" dirty="0" smtClean="0"/>
+              <a:t>“None of your business.”</a:t>
+            </a:r>
+          </a:p>
+          <a:p>
+            <a:pPr lvl="1"/>
+            <a:endParaRPr lang="en-US" dirty="0" smtClean="0"/>
+          </a:p>
+          <a:p>
+            <a:r>
+              <a:rPr lang="en-US" dirty="0"/>
+              <a:t>Bag of words</a:t>
+            </a:r>
+          </a:p>
+          <a:p>
+            <a:pPr lvl="1"/>
+            <a:r>
+              <a:rPr lang="en-US" dirty="0"/>
+              <a:t>[(“business”, 2), (“is”, 1)]</a:t>
+            </a:r>
+          </a:p>
+          <a:p>
+            <a:pPr lvl="1"/>
+            <a:r>
+              <a:rPr lang="en-US" dirty="0"/>
+              <a:t>[(“None”, 1), (“of”, 1), (“your”, 1), (“business”, 1)]</a:t>
+            </a:r>
+          </a:p>
+          <a:p>
+            <a:endParaRPr lang="en-US" dirty="0"/>
+          </a:p>
+          <a:p>
+            <a:r>
+              <a:rPr lang="en-US" dirty="0" smtClean="0"/>
+              <a:t>Term-document matrix</a:t>
+            </a:r>
+          </a:p>
+          <a:p>
+            <a:pPr lvl="1"/>
+            <a:endParaRPr lang="en-US" dirty="0" smtClean="0"/>
+          </a:p>
+          <a:p>
+            <a:pPr marL="274320" lvl="1" indent="0">
+              <a:buNone/>
+            </a:pPr>
+            <a:endParaRPr lang="en-US" dirty="0" smtClean="0"/>
+          </a:p>
+        </p:txBody>
+      </p:sp>
+      <p:graphicFrame>
+        <p:nvGraphicFramePr>
+          <p:cNvPr id="4" name="Table 3"/>
+          <p:cNvGraphicFramePr>
+            <a:graphicFrameLocks noGrp="1"/>
+          </p:cNvGraphicFramePr>
+          <p:nvPr>
+            <p:extLst>
+              <p:ext uri="{D42A27DB-BD31-4B8C-83A1-F6EECF244321}">
+                <p14:modId xmlns:p14="http://schemas.microsoft.com/office/powerpoint/2010/main" val="3351413792"/>
+              </p:ext>
+            </p:extLst>
+          </p:nvPr>
+        </p:nvGraphicFramePr>
+        <p:xfrm>
+          <a:off x="1117600" y="5283198"/>
+          <a:ext cx="5350932" cy="1193802"/>
+        </p:xfrm>
+        <a:graphic>
+          <a:graphicData uri="http://schemas.openxmlformats.org/drawingml/2006/table">
+            <a:tbl>
+              <a:tblPr firstRow="1" bandRow="1">
+                <a:tableStyleId>{5C22544A-7EE6-4342-B048-85BDC9FD1C3A}</a:tableStyleId>
+              </a:tblPr>
+              <a:tblGrid>
+                <a:gridCol w="891822"/>
+                <a:gridCol w="1360311"/>
+                <a:gridCol w="423333"/>
+                <a:gridCol w="891822"/>
+                <a:gridCol w="891822"/>
+                <a:gridCol w="891822"/>
+              </a:tblGrid>
+              <a:tr h="397934">
+                <a:tc>
+                  <a:txBody>
+                    <a:bodyPr/>
+                    <a:lstStyle/>
+                    <a:p>
+                      <a:endParaRPr lang="en-US" dirty="0"/>
+                    </a:p>
+                  </a:txBody>
+                  <a:tcPr/>
+                </a:tc>
+                <a:tc>
+                  <a:txBody>
+                    <a:bodyPr/>
+                    <a:lstStyle/>
+                    <a:p>
+                      <a:r>
+                        <a:rPr lang="en-US" dirty="0" smtClean="0"/>
+                        <a:t>Business</a:t>
+                      </a:r>
+                      <a:endParaRPr lang="en-US" dirty="0"/>
+                    </a:p>
+                  </a:txBody>
+                  <a:tcPr/>
+                </a:tc>
+                <a:tc>
+                  <a:txBody>
+                    <a:bodyPr/>
+                    <a:lstStyle/>
+                    <a:p>
+                      <a:r>
+                        <a:rPr lang="en-US" dirty="0" smtClean="0"/>
+                        <a:t>Is</a:t>
+                      </a:r>
+                      <a:endParaRPr lang="en-US" dirty="0"/>
+                    </a:p>
+                  </a:txBody>
+                  <a:tcPr/>
+                </a:tc>
+                <a:tc>
+                  <a:txBody>
+                    <a:bodyPr/>
+                    <a:lstStyle/>
+                    <a:p>
+                      <a:r>
+                        <a:rPr lang="en-US" dirty="0" smtClean="0"/>
+                        <a:t>None</a:t>
+                      </a:r>
+                      <a:endParaRPr lang="en-US" dirty="0"/>
+                    </a:p>
+                  </a:txBody>
+                  <a:tcPr/>
+                </a:tc>
+                <a:tc>
+                  <a:txBody>
+                    <a:bodyPr/>
+                    <a:lstStyle/>
+                    <a:p>
+                      <a:r>
+                        <a:rPr lang="en-US" dirty="0" smtClean="0"/>
+                        <a:t>Of</a:t>
+                      </a:r>
+                      <a:endParaRPr lang="en-US" dirty="0"/>
+                    </a:p>
+                  </a:txBody>
+                  <a:tcPr/>
+                </a:tc>
+                <a:tc>
+                  <a:txBody>
+                    <a:bodyPr/>
+                    <a:lstStyle/>
+                    <a:p>
+                      <a:r>
+                        <a:rPr lang="en-US" dirty="0" smtClean="0"/>
+                        <a:t>Your</a:t>
+                      </a:r>
+                      <a:endParaRPr lang="en-US" dirty="0"/>
+                    </a:p>
+                  </a:txBody>
+                  <a:tcPr/>
+                </a:tc>
+              </a:tr>
+              <a:tr h="397934">
+                <a:tc>
+                  <a:txBody>
+                    <a:bodyPr/>
+                    <a:lstStyle/>
+                    <a:p>
+                      <a:r>
+                        <a:rPr lang="en-US" dirty="0" smtClean="0"/>
+                        <a:t>Doc 1</a:t>
+                      </a:r>
+                      <a:endParaRPr lang="en-US" dirty="0"/>
+                    </a:p>
+                  </a:txBody>
+                  <a:tcPr/>
+                </a:tc>
+                <a:tc>
+                  <a:txBody>
+                    <a:bodyPr/>
+                    <a:lstStyle/>
+                    <a:p>
+                      <a:r>
+                        <a:rPr lang="en-US" dirty="0" smtClean="0"/>
+                        <a:t>2</a:t>
+                      </a:r>
+                      <a:endParaRPr lang="en-US" dirty="0"/>
+                    </a:p>
+                  </a:txBody>
+                  <a:tcPr/>
+                </a:tc>
+                <a:tc>
+                  <a:txBody>
+                    <a:bodyPr/>
+                    <a:lstStyle/>
+                    <a:p>
+                      <a:r>
+                        <a:rPr lang="en-US" dirty="0" smtClean="0"/>
+                        <a:t>1</a:t>
+                      </a:r>
+                      <a:endParaRPr lang="en-US" dirty="0"/>
+                    </a:p>
+                  </a:txBody>
+                  <a:tcPr/>
+                </a:tc>
+                <a:tc>
+                  <a:txBody>
+                    <a:bodyPr/>
+                    <a:lstStyle/>
+                    <a:p>
+                      <a:r>
+                        <a:rPr lang="en-US" dirty="0" smtClean="0"/>
+                        <a:t>0</a:t>
+                      </a:r>
+                      <a:endParaRPr lang="en-US" dirty="0"/>
+                    </a:p>
+                  </a:txBody>
+                  <a:tcPr/>
+                </a:tc>
+                <a:tc>
+                  <a:txBody>
+                    <a:bodyPr/>
+                    <a:lstStyle/>
+                    <a:p>
+                      <a:r>
+                        <a:rPr lang="en-US" dirty="0" smtClean="0"/>
+                        <a:t>0</a:t>
+                      </a:r>
+                      <a:endParaRPr lang="en-US" dirty="0"/>
+                    </a:p>
+                  </a:txBody>
+                  <a:tcPr/>
+                </a:tc>
+                <a:tc>
+                  <a:txBody>
+                    <a:bodyPr/>
+                    <a:lstStyle/>
+                    <a:p>
+                      <a:r>
+                        <a:rPr lang="en-US" dirty="0" smtClean="0"/>
+                        <a:t>0</a:t>
+                      </a:r>
+                      <a:endParaRPr lang="en-US" dirty="0"/>
+                    </a:p>
+                  </a:txBody>
+                  <a:tcPr/>
+                </a:tc>
+              </a:tr>
+              <a:tr h="397934">
+                <a:tc>
+                  <a:txBody>
+                    <a:bodyPr/>
+                    <a:lstStyle/>
+                    <a:p>
+                      <a:r>
+                        <a:rPr lang="en-US" dirty="0" smtClean="0"/>
+                        <a:t>Doc 2</a:t>
+                      </a:r>
+                      <a:endParaRPr lang="en-US" dirty="0"/>
+                    </a:p>
+                  </a:txBody>
+                  <a:tcPr/>
+                </a:tc>
+                <a:tc>
+                  <a:txBody>
+                    <a:bodyPr/>
+                    <a:lstStyle/>
+                    <a:p>
+                      <a:r>
+                        <a:rPr lang="en-US" dirty="0" smtClean="0"/>
+                        <a:t>1</a:t>
+                      </a:r>
+                      <a:endParaRPr lang="en-US" dirty="0"/>
+                    </a:p>
+                  </a:txBody>
+                  <a:tcPr/>
+                </a:tc>
+                <a:tc>
+                  <a:txBody>
+                    <a:bodyPr/>
+                    <a:lstStyle/>
+                    <a:p>
+                      <a:r>
+                        <a:rPr lang="en-US" dirty="0" smtClean="0"/>
+                        <a:t>0</a:t>
+                      </a:r>
+                      <a:endParaRPr lang="en-US" dirty="0"/>
+                    </a:p>
+                  </a:txBody>
+                  <a:tcPr/>
+                </a:tc>
+                <a:tc>
+                  <a:txBody>
+                    <a:bodyPr/>
+                    <a:lstStyle/>
+                    <a:p>
+                      <a:r>
+                        <a:rPr lang="en-US" dirty="0" smtClean="0"/>
+                        <a:t>1</a:t>
+                      </a:r>
+                      <a:endParaRPr lang="en-US" dirty="0"/>
+                    </a:p>
+                  </a:txBody>
+                  <a:tcPr/>
+                </a:tc>
+                <a:tc>
+                  <a:txBody>
+                    <a:bodyPr/>
+                    <a:lstStyle/>
+                    <a:p>
+                      <a:r>
+                        <a:rPr lang="en-US" dirty="0" smtClean="0"/>
+                        <a:t>1</a:t>
+                      </a:r>
+                      <a:endParaRPr lang="en-US" dirty="0"/>
+                    </a:p>
+                  </a:txBody>
+                  <a:tcPr/>
+                </a:tc>
+                <a:tc>
+                  <a:txBody>
+                    <a:bodyPr/>
+                    <a:lstStyle/>
+                    <a:p>
+                      <a:r>
+                        <a:rPr lang="en-US" dirty="0" smtClean="0"/>
+                        <a:t>1</a:t>
+                      </a:r>
+                      <a:endParaRPr lang="en-US" dirty="0"/>
+                    </a:p>
+                  </a:txBody>
+                  <a:tcPr/>
+                </a:tc>
+              </a:tr>
+            </a:tbl>
+          </a:graphicData>
+        </a:graphic>
+      </p:graphicFrame>
+    </p:spTree>
+    <p:extLst>
+      <p:ext uri="{BB962C8B-B14F-4D97-AF65-F5344CB8AC3E}">
+        <p14:creationId xmlns:p14="http://schemas.microsoft.com/office/powerpoint/2010/main" val="3198492193"/>
+      </p:ext>
+    </p:extLst>
+  </p:cSld>
+  <p:clrMapOvr>
+    <a:masterClrMapping/>
+  </p:clrMapOvr>
+  <p:timing>
+    <p:tnLst>
+      <p:par>
+        <p:cTn xmlns:p14="http://schemas.microsoft.com/office/powerpoint/2010/main" id="1" dur="indefinite" restart="never" nodeType="tmRoot"/>
+      </p:par>
+    </p:tnLst>
+  </p:timing>
+</p:sld>
+</file>
+
 <file path=ppt/slides/slide6.xml><?xml version="1.0" encoding="utf-8"?>
 <p:sld xmlns:a="http://schemas.openxmlformats.org/drawingml/2006/main" xmlns:r="http://schemas.openxmlformats.org/officeDocument/2006/relationships" xmlns:p="http://schemas.openxmlformats.org/presentationml/2006/main">
   <p:cSld>
@@ -4236,20 +4936,38 @@
           <a:p>
             <a:r>
               <a:rPr lang="en-US" dirty="0" smtClean="0"/>
-              <a:t>Topic </a:t>
-            </a:r>
-            <a:r>
-              <a:rPr lang="en-US" dirty="0" smtClean="0"/>
-              <a:t>Modeling techniques</a:t>
+              <a:t>Term-Document Matrix</a:t>
             </a:r>
             <a:endParaRPr lang="en-US" dirty="0"/>
           </a:p>
         </p:txBody>
       </p:sp>
+      <p:pic>
+        <p:nvPicPr>
+          <p:cNvPr id="5" name="Content Placeholder 4"/>
+          <p:cNvPicPr>
+            <a:picLocks noGrp="1" noChangeAspect="1"/>
+          </p:cNvPicPr>
+          <p:nvPr>
+            <p:ph idx="1"/>
+          </p:nvPr>
+        </p:nvPicPr>
+        <p:blipFill rotWithShape="1">
+          <a:blip r:embed="rId2"/>
+          <a:srcRect l="2741" t="5402" r="2142" b="5436"/>
+          <a:stretch/>
+        </p:blipFill>
+        <p:spPr>
+          <a:xfrm>
+            <a:off x="657141" y="1709496"/>
+            <a:ext cx="7883920" cy="4511753"/>
+          </a:xfrm>
+        </p:spPr>
+      </p:pic>
     </p:spTree>
     <p:extLst>
       <p:ext uri="{BB962C8B-B14F-4D97-AF65-F5344CB8AC3E}">
-        <p14:creationId xmlns:p14="http://schemas.microsoft.com/office/powerpoint/2010/main" val="3718068899"/>
+        <p14:creationId xmlns:p14="http://schemas.microsoft.com/office/powerpoint/2010/main" val="1386330539"/>
       </p:ext>
     </p:extLst>
   </p:cSld>
@@ -4295,88 +5013,12 @@
         </p:nvSpPr>
         <p:spPr/>
         <p:txBody>
-          <a:bodyPr>
-            <a:normAutofit/>
-          </a:bodyPr>
-          <a:lstStyle/>
-          <a:p>
-            <a:r>
-              <a:rPr lang="en-US" dirty="0" smtClean="0"/>
-              <a:t>Latent </a:t>
-            </a:r>
-            <a:r>
-              <a:rPr lang="en-US" dirty="0" err="1" smtClean="0"/>
-              <a:t>Dirichlet</a:t>
-            </a:r>
-            <a:r>
-              <a:rPr lang="en-US" dirty="0" smtClean="0"/>
-              <a:t> </a:t>
-            </a:r>
-            <a:r>
-              <a:rPr lang="en-US" dirty="0" smtClean="0"/>
-              <a:t>Allocation (LDA)</a:t>
-            </a:r>
-            <a:endParaRPr lang="en-US" dirty="0"/>
-          </a:p>
-        </p:txBody>
-      </p:sp>
-      <p:sp>
-        <p:nvSpPr>
-          <p:cNvPr id="4" name="TextBox 3"/>
-          <p:cNvSpPr txBox="1"/>
-          <p:nvPr/>
-        </p:nvSpPr>
-        <p:spPr>
-          <a:xfrm>
-            <a:off x="799163" y="2356032"/>
-            <a:ext cx="6564557" cy="369332"/>
-          </a:xfrm>
-          <a:prstGeom prst="rect">
-            <a:avLst/>
-          </a:prstGeom>
-          <a:noFill/>
-        </p:spPr>
-        <p:txBody>
-          <a:bodyPr wrap="square" rtlCol="0">
-            <a:spAutoFit/>
-          </a:bodyPr>
-          <a:lstStyle/>
-          <a:p>
-            <a:r>
-              <a:rPr lang="en-US" dirty="0" smtClean="0"/>
-              <a:t>Take </a:t>
-            </a:r>
-            <a:r>
-              <a:rPr lang="en-US" dirty="0" err="1" smtClean="0"/>
-              <a:t>pLSA</a:t>
-            </a:r>
-            <a:r>
-              <a:rPr lang="en-US" dirty="0" smtClean="0"/>
-              <a:t>, then put </a:t>
-            </a:r>
-            <a:r>
-              <a:rPr lang="en-US" dirty="0"/>
-              <a:t>a </a:t>
-            </a:r>
-            <a:r>
-              <a:rPr lang="en-US" dirty="0" err="1"/>
-              <a:t>Dirichlet</a:t>
-            </a:r>
-            <a:r>
-              <a:rPr lang="en-US" dirty="0"/>
-              <a:t> </a:t>
-            </a:r>
-            <a:r>
-              <a:rPr lang="en-US" dirty="0" smtClean="0"/>
-              <a:t>prior </a:t>
-            </a:r>
-            <a:r>
-              <a:rPr lang="en-US" dirty="0"/>
-              <a:t>on a word given a </a:t>
-            </a:r>
-            <a:r>
-              <a:rPr lang="en-US" dirty="0" smtClean="0"/>
-              <a:t>topic…</a:t>
+          <a:bodyPr/>
+          <a:lstStyle/>
+          <a:p>
+            <a:r>
+              <a:rPr lang="en-US" dirty="0" smtClean="0"/>
+              <a:t>Topic Modeling techniques</a:t>
             </a:r>
             <a:endParaRPr lang="en-US" dirty="0"/>
           </a:p>
@@ -4385,7 +5027,7 @@
     </p:spTree>
     <p:extLst>
       <p:ext uri="{BB962C8B-B14F-4D97-AF65-F5344CB8AC3E}">
-        <p14:creationId xmlns:p14="http://schemas.microsoft.com/office/powerpoint/2010/main" val="3760624967"/>
+        <p14:creationId xmlns:p14="http://schemas.microsoft.com/office/powerpoint/2010/main" val="3718068899"/>
       </p:ext>
     </p:extLst>
   </p:cSld>
@@ -4432,17 +5074,440 @@
         <p:spPr/>
         <p:txBody>
           <a:bodyPr>
+            <a:normAutofit/>
+          </a:bodyPr>
+          <a:lstStyle/>
+          <a:p>
+            <a:r>
+              <a:rPr lang="en-US" dirty="0" smtClean="0"/>
+              <a:t>Latent </a:t>
+            </a:r>
+            <a:r>
+              <a:rPr lang="en-US" dirty="0" err="1" smtClean="0"/>
+              <a:t>Dirichlet</a:t>
+            </a:r>
+            <a:r>
+              <a:rPr lang="en-US" dirty="0" smtClean="0"/>
+              <a:t> Allocation (LDA)</a:t>
+            </a:r>
+            <a:endParaRPr lang="en-US" dirty="0"/>
+          </a:p>
+        </p:txBody>
+      </p:sp>
+      <p:sp>
+        <p:nvSpPr>
+          <p:cNvPr id="5" name="Content Placeholder 2"/>
+          <p:cNvSpPr txBox="1">
+            <a:spLocks/>
+          </p:cNvSpPr>
+          <p:nvPr/>
+        </p:nvSpPr>
+        <p:spPr>
+          <a:xfrm>
+            <a:off x="457200" y="1600200"/>
+            <a:ext cx="6739467" cy="4876800"/>
+          </a:xfrm>
+          <a:prstGeom prst="rect">
+            <a:avLst/>
+          </a:prstGeom>
+        </p:spPr>
+        <p:txBody>
+          <a:bodyPr/>
+          <a:lstStyle>
+            <a:lvl1pPr marL="182880" indent="-182880" algn="l" defTabSz="914400" rtl="0" eaLnBrk="1" latinLnBrk="0" hangingPunct="1">
+              <a:spcBef>
+                <a:spcPct val="20000"/>
+              </a:spcBef>
+              <a:buClr>
+                <a:schemeClr val="accent1"/>
+              </a:buClr>
+              <a:buSzPct val="85000"/>
+              <a:buFont typeface="Arial" pitchFamily="34" charset="0"/>
+              <a:buChar char="•"/>
+              <a:defRPr sz="2400" kern="1200">
+                <a:solidFill>
+                  <a:schemeClr val="tx1"/>
+                </a:solidFill>
+                <a:latin typeface="+mn-lt"/>
+                <a:ea typeface="+mn-ea"/>
+                <a:cs typeface="+mn-cs"/>
+              </a:defRPr>
+            </a:lvl1pPr>
+            <a:lvl2pPr marL="457200" indent="-182880" algn="l" defTabSz="914400" rtl="0" eaLnBrk="1" latinLnBrk="0" hangingPunct="1">
+              <a:spcBef>
+                <a:spcPct val="20000"/>
+              </a:spcBef>
+              <a:buClr>
+                <a:schemeClr val="accent1"/>
+              </a:buClr>
+              <a:buSzPct val="85000"/>
+              <a:buFont typeface="Arial" pitchFamily="34" charset="0"/>
+              <a:buChar char="•"/>
+              <a:defRPr sz="2000" kern="1200">
+                <a:solidFill>
+                  <a:schemeClr val="tx1"/>
+                </a:solidFill>
+                <a:latin typeface="+mn-lt"/>
+                <a:ea typeface="+mn-ea"/>
+                <a:cs typeface="+mn-cs"/>
+              </a:defRPr>
+            </a:lvl2pPr>
+            <a:lvl3pPr marL="731520" indent="-182880" algn="l" defTabSz="914400" rtl="0" eaLnBrk="1" latinLnBrk="0" hangingPunct="1">
+              <a:spcBef>
+                <a:spcPct val="20000"/>
+              </a:spcBef>
+              <a:buClr>
+                <a:schemeClr val="accent1"/>
+              </a:buClr>
+              <a:buSzPct val="90000"/>
+              <a:buFont typeface="Arial" pitchFamily="34" charset="0"/>
+              <a:buChar char="•"/>
+              <a:defRPr sz="1800" kern="1200">
+                <a:solidFill>
+                  <a:schemeClr val="tx1"/>
+                </a:solidFill>
+                <a:latin typeface="+mn-lt"/>
+                <a:ea typeface="+mn-ea"/>
+                <a:cs typeface="+mn-cs"/>
+              </a:defRPr>
+            </a:lvl3pPr>
+            <a:lvl4pPr marL="1005840" indent="-182880" algn="l" defTabSz="914400" rtl="0" eaLnBrk="1" latinLnBrk="0" hangingPunct="1">
+              <a:spcBef>
+                <a:spcPct val="20000"/>
+              </a:spcBef>
+              <a:buClr>
+                <a:schemeClr val="accent1"/>
+              </a:buClr>
+              <a:buFont typeface="Arial" pitchFamily="34" charset="0"/>
+              <a:buChar char="•"/>
+              <a:defRPr sz="1600" kern="1200">
+                <a:solidFill>
+                  <a:schemeClr val="tx1"/>
+                </a:solidFill>
+                <a:latin typeface="+mn-lt"/>
+                <a:ea typeface="+mn-ea"/>
+                <a:cs typeface="+mn-cs"/>
+              </a:defRPr>
+            </a:lvl4pPr>
+            <a:lvl5pPr marL="1188720" indent="-137160" algn="l" defTabSz="914400" rtl="0" eaLnBrk="1" latinLnBrk="0" hangingPunct="1">
+              <a:spcBef>
+                <a:spcPct val="20000"/>
+              </a:spcBef>
+              <a:buClr>
+                <a:schemeClr val="accent1"/>
+              </a:buClr>
+              <a:buSzPct val="100000"/>
+              <a:buFont typeface="Arial" pitchFamily="34" charset="0"/>
+              <a:buChar char="•"/>
+              <a:defRPr sz="1400" kern="1200" baseline="0">
+                <a:solidFill>
+                  <a:schemeClr val="tx1"/>
+                </a:solidFill>
+                <a:latin typeface="+mn-lt"/>
+                <a:ea typeface="+mn-ea"/>
+                <a:cs typeface="+mn-cs"/>
+              </a:defRPr>
+            </a:lvl5pPr>
+            <a:lvl6pPr marL="1371600" indent="-182880" algn="l" defTabSz="914400" rtl="0" eaLnBrk="1" latinLnBrk="0" hangingPunct="1">
+              <a:spcBef>
+                <a:spcPct val="20000"/>
+              </a:spcBef>
+              <a:buClr>
+                <a:schemeClr val="accent1"/>
+              </a:buClr>
+              <a:buFont typeface="Arial" pitchFamily="34" charset="0"/>
+              <a:buChar char="•"/>
+              <a:defRPr sz="1300" kern="1200">
+                <a:solidFill>
+                  <a:schemeClr val="tx1"/>
+                </a:solidFill>
+                <a:latin typeface="+mn-lt"/>
+                <a:ea typeface="+mn-ea"/>
+                <a:cs typeface="+mn-cs"/>
+              </a:defRPr>
+            </a:lvl6pPr>
+            <a:lvl7pPr marL="1554480" indent="-182880" algn="l" defTabSz="914400" rtl="0" eaLnBrk="1" latinLnBrk="0" hangingPunct="1">
+              <a:spcBef>
+                <a:spcPct val="20000"/>
+              </a:spcBef>
+              <a:buClr>
+                <a:schemeClr val="accent1"/>
+              </a:buClr>
+              <a:buFont typeface="Arial" pitchFamily="34" charset="0"/>
+              <a:buChar char="•"/>
+              <a:defRPr sz="1300" kern="1200">
+                <a:solidFill>
+                  <a:schemeClr val="tx1"/>
+                </a:solidFill>
+                <a:latin typeface="+mn-lt"/>
+                <a:ea typeface="+mn-ea"/>
+                <a:cs typeface="+mn-cs"/>
+              </a:defRPr>
+            </a:lvl7pPr>
+            <a:lvl8pPr marL="1737360" indent="-182880" algn="l" defTabSz="914400" rtl="0" eaLnBrk="1" latinLnBrk="0" hangingPunct="1">
+              <a:spcBef>
+                <a:spcPct val="20000"/>
+              </a:spcBef>
+              <a:buClr>
+                <a:schemeClr val="accent1"/>
+              </a:buClr>
+              <a:buFont typeface="Arial" pitchFamily="34" charset="0"/>
+              <a:buChar char="•"/>
+              <a:defRPr sz="1300" kern="1200">
+                <a:solidFill>
+                  <a:schemeClr val="tx1"/>
+                </a:solidFill>
+                <a:latin typeface="+mn-lt"/>
+                <a:ea typeface="+mn-ea"/>
+                <a:cs typeface="+mn-cs"/>
+              </a:defRPr>
+            </a:lvl8pPr>
+            <a:lvl9pPr marL="1920240" indent="-182880" algn="l" defTabSz="914400" rtl="0" eaLnBrk="1" latinLnBrk="0" hangingPunct="1">
+              <a:spcBef>
+                <a:spcPct val="20000"/>
+              </a:spcBef>
+              <a:buClr>
+                <a:schemeClr val="accent1"/>
+              </a:buClr>
+              <a:buFont typeface="Arial" pitchFamily="34" charset="0"/>
+              <a:buChar char="•"/>
+              <a:defRPr sz="1300" kern="1200">
+                <a:solidFill>
+                  <a:schemeClr val="tx1"/>
+                </a:solidFill>
+                <a:latin typeface="+mn-lt"/>
+                <a:ea typeface="+mn-ea"/>
+                <a:cs typeface="+mn-cs"/>
+              </a:defRPr>
+            </a:lvl9pPr>
+          </a:lstStyle>
+          <a:p>
+            <a:r>
+              <a:rPr lang="en-US" dirty="0" smtClean="0"/>
+              <a:t>Assume latent topics in the data</a:t>
+            </a:r>
+          </a:p>
+          <a:p>
+            <a:r>
+              <a:rPr lang="en-US" dirty="0" smtClean="0"/>
+              <a:t>Generative model of document creation</a:t>
+            </a:r>
+          </a:p>
+          <a:p>
+            <a:pPr marL="0" indent="0">
+              <a:buNone/>
+            </a:pPr>
+            <a:endParaRPr lang="en-US" dirty="0"/>
+          </a:p>
+          <a:p>
+            <a:r>
+              <a:rPr lang="en-US" dirty="0" smtClean="0"/>
+              <a:t>Modeling documents</a:t>
+            </a:r>
+          </a:p>
+          <a:p>
+            <a:pPr lvl="1"/>
+            <a:r>
+              <a:rPr lang="en-US" dirty="0" smtClean="0"/>
+              <a:t>Each document </a:t>
+            </a:r>
+            <a:r>
+              <a:rPr lang="en-US" i="1" dirty="0" smtClean="0"/>
+              <a:t>d</a:t>
+            </a:r>
+            <a:r>
+              <a:rPr lang="en-US" dirty="0" smtClean="0"/>
+              <a:t> has a distribution </a:t>
+            </a:r>
+            <a:r>
+              <a:rPr lang="en-US" dirty="0" err="1" smtClean="0"/>
+              <a:t>θ</a:t>
+            </a:r>
+            <a:r>
+              <a:rPr lang="en-US" baseline="-25000" dirty="0" err="1" smtClean="0"/>
+              <a:t>d</a:t>
+            </a:r>
+            <a:r>
+              <a:rPr lang="en-US" dirty="0" smtClean="0"/>
+              <a:t> of topics </a:t>
+            </a:r>
+          </a:p>
+          <a:p>
+            <a:pPr lvl="1"/>
+            <a:r>
+              <a:rPr lang="en-US" dirty="0" smtClean="0"/>
+              <a:t>Start out with a prior </a:t>
+            </a:r>
+            <a:r>
+              <a:rPr lang="en-US" dirty="0" err="1"/>
+              <a:t>θ</a:t>
+            </a:r>
+            <a:r>
+              <a:rPr lang="en-US" dirty="0" smtClean="0"/>
+              <a:t> ~ </a:t>
+            </a:r>
+            <a:r>
+              <a:rPr lang="en-US" dirty="0" err="1" smtClean="0"/>
+              <a:t>Dirichlet</a:t>
+            </a:r>
+            <a:r>
+              <a:rPr lang="en-US" dirty="0" smtClean="0"/>
+              <a:t>(α)</a:t>
+            </a:r>
+          </a:p>
+          <a:p>
+            <a:pPr lvl="1"/>
+            <a:r>
+              <a:rPr lang="en-US" dirty="0" smtClean="0"/>
+              <a:t>Update to get posterior  distribution given documents</a:t>
+            </a:r>
+          </a:p>
+          <a:p>
+            <a:pPr lvl="2"/>
+            <a:r>
+              <a:rPr lang="en-US" dirty="0" smtClean="0"/>
+              <a:t>Given </a:t>
+            </a:r>
+            <a:r>
+              <a:rPr lang="en-US" dirty="0"/>
+              <a:t>α</a:t>
+            </a:r>
+            <a:r>
+              <a:rPr lang="en-US" dirty="0" smtClean="0"/>
+              <a:t> and β, the distribution of words given topics</a:t>
+            </a:r>
+          </a:p>
+          <a:p>
+            <a:pPr lvl="2"/>
+            <a:r>
+              <a:rPr lang="en-US" dirty="0"/>
+              <a:t>U</a:t>
+            </a:r>
+            <a:r>
+              <a:rPr lang="en-US" dirty="0" smtClean="0"/>
+              <a:t>se EM to maximize log likelihood of data</a:t>
+            </a:r>
+            <a:endParaRPr lang="en-US" dirty="0"/>
+          </a:p>
+          <a:p>
+            <a:r>
+              <a:rPr lang="en-US" dirty="0" smtClean="0"/>
+              <a:t>Generating documents on a per-word basis</a:t>
+            </a:r>
+          </a:p>
+          <a:p>
+            <a:pPr lvl="1"/>
+            <a:r>
+              <a:rPr lang="en-US" dirty="0" smtClean="0"/>
+              <a:t>Draw a topic from topic </a:t>
+            </a:r>
+            <a:r>
+              <a:rPr lang="en-US" dirty="0"/>
+              <a:t>distribution </a:t>
+            </a:r>
+            <a:r>
+              <a:rPr lang="en-US" dirty="0" err="1"/>
+              <a:t>θ</a:t>
+            </a:r>
+            <a:r>
+              <a:rPr lang="en-US" baseline="-25000" dirty="0" err="1"/>
+              <a:t>d</a:t>
+            </a:r>
+            <a:endParaRPr lang="en-US" dirty="0" smtClean="0"/>
+          </a:p>
+          <a:p>
+            <a:pPr lvl="1"/>
+            <a:r>
+              <a:rPr lang="en-US" dirty="0" smtClean="0"/>
+              <a:t>Draw a word from the word distribution of the topic</a:t>
+            </a:r>
+            <a:endParaRPr lang="en-US" dirty="0" smtClean="0"/>
+          </a:p>
+        </p:txBody>
+      </p:sp>
+      <p:sp>
+        <p:nvSpPr>
+          <p:cNvPr id="3" name="TextBox 2"/>
+          <p:cNvSpPr txBox="1"/>
+          <p:nvPr/>
+        </p:nvSpPr>
+        <p:spPr>
+          <a:xfrm>
+            <a:off x="6350000" y="1744133"/>
+            <a:ext cx="2641600" cy="369332"/>
+          </a:xfrm>
+          <a:prstGeom prst="rect">
+            <a:avLst/>
+          </a:prstGeom>
+          <a:noFill/>
+        </p:spPr>
+        <p:txBody>
+          <a:bodyPr wrap="square" rtlCol="0">
+            <a:spAutoFit/>
+          </a:bodyPr>
+          <a:lstStyle/>
+          <a:p>
+            <a:endParaRPr lang="en-US" dirty="0"/>
+          </a:p>
+        </p:txBody>
+      </p:sp>
+    </p:spTree>
+    <p:extLst>
+      <p:ext uri="{BB962C8B-B14F-4D97-AF65-F5344CB8AC3E}">
+        <p14:creationId xmlns:p14="http://schemas.microsoft.com/office/powerpoint/2010/main" val="3760624967"/>
+      </p:ext>
+    </p:extLst>
+  </p:cSld>
+  <p:clrMapOvr>
+    <a:masterClrMapping/>
+  </p:clrMapOvr>
+  <p:timing>
+    <p:tnLst>
+      <p:par>
+        <p:cTn xmlns:p14="http://schemas.microsoft.com/office/powerpoint/2010/main" id="1" dur="indefinite" restart="never" nodeType="tmRoot"/>
+      </p:par>
+    </p:tnLst>
+  </p:timing>
+</p:sld>
+</file>
+
+<file path=ppt/slides/slide9.xml><?xml version="1.0" encoding="utf-8"?>
+<p:sld xmlns:a="http://schemas.openxmlformats.org/drawingml/2006/main" xmlns:r="http://schemas.openxmlformats.org/officeDocument/2006/relationships" xmlns:p="http://schemas.openxmlformats.org/presentationml/2006/main">
+  <p:cSld>
+    <p:spTree>
+      <p:nvGrpSpPr>
+        <p:cNvPr id="1" name=""/>
+        <p:cNvGrpSpPr/>
+        <p:nvPr/>
+      </p:nvGrpSpPr>
+      <p:grpSpPr>
+        <a:xfrm>
+          <a:off x="0" y="0"/>
+          <a:ext cx="0" cy="0"/>
+          <a:chOff x="0" y="0"/>
+          <a:chExt cx="0" cy="0"/>
+        </a:xfrm>
+      </p:grpSpPr>
+      <p:sp>
+        <p:nvSpPr>
+          <p:cNvPr id="2" name="Title 1"/>
+          <p:cNvSpPr>
+            <a:spLocks noGrp="1"/>
+          </p:cNvSpPr>
+          <p:nvPr>
+            <p:ph type="title"/>
+          </p:nvPr>
+        </p:nvSpPr>
+        <p:spPr/>
+        <p:txBody>
+          <a:bodyPr>
             <a:normAutofit fontScale="90000"/>
           </a:bodyPr>
           <a:lstStyle/>
           <a:p>
             <a:r>
               <a:rPr lang="en-US" dirty="0" smtClean="0"/>
-              <a:t>Non-negative Matrix </a:t>
-            </a:r>
-            <a:r>
-              <a:rPr lang="en-US" dirty="0" smtClean="0"/>
-              <a:t>Factorization (NMF)</a:t>
+              <a:t>Non-negative Matrix Factorization (NMF)</a:t>
             </a:r>
             <a:endParaRPr lang="en-US" dirty="0"/>
           </a:p>
@@ -4545,66 +5610,6 @@
     <p:extLst>
       <p:ext uri="{BB962C8B-B14F-4D97-AF65-F5344CB8AC3E}">
         <p14:creationId xmlns:p14="http://schemas.microsoft.com/office/powerpoint/2010/main" val="4246377900"/>
-      </p:ext>
-    </p:extLst>
-  </p:cSld>
-  <p:clrMapOvr>
-    <a:masterClrMapping/>
-  </p:clrMapOvr>
-  <p:timing>
-    <p:tnLst>
-      <p:par>
-        <p:cTn xmlns:p14="http://schemas.microsoft.com/office/powerpoint/2010/main" id="1" dur="indefinite" restart="never" nodeType="tmRoot"/>
-      </p:par>
-    </p:tnLst>
-  </p:timing>
-</p:sld>
-</file>
-
-<file path=ppt/slides/slide9.xml><?xml version="1.0" encoding="utf-8"?>
-<p:sld xmlns:a="http://schemas.openxmlformats.org/drawingml/2006/main" xmlns:r="http://schemas.openxmlformats.org/officeDocument/2006/relationships" xmlns:p="http://schemas.openxmlformats.org/presentationml/2006/main">
-  <p:cSld>
-    <p:spTree>
-      <p:nvGrpSpPr>
-        <p:cNvPr id="1" name=""/>
-        <p:cNvGrpSpPr/>
-        <p:nvPr/>
-      </p:nvGrpSpPr>
-      <p:grpSpPr>
-        <a:xfrm>
-          <a:off x="0" y="0"/>
-          <a:ext cx="0" cy="0"/>
-          <a:chOff x="0" y="0"/>
-          <a:chExt cx="0" cy="0"/>
-        </a:xfrm>
-      </p:grpSpPr>
-      <p:sp>
-        <p:nvSpPr>
-          <p:cNvPr id="2" name="Title 1"/>
-          <p:cNvSpPr>
-            <a:spLocks noGrp="1"/>
-          </p:cNvSpPr>
-          <p:nvPr>
-            <p:ph type="title"/>
-          </p:nvPr>
-        </p:nvSpPr>
-        <p:spPr/>
-        <p:txBody>
-          <a:bodyPr/>
-          <a:lstStyle/>
-          <a:p>
-            <a:r>
-              <a:rPr lang="en-US" dirty="0" smtClean="0"/>
-              <a:t>Methods for setting number of topics</a:t>
-            </a:r>
-            <a:endParaRPr lang="en-US" dirty="0"/>
-          </a:p>
-        </p:txBody>
-      </p:sp>
-    </p:spTree>
-    <p:extLst>
-      <p:ext uri="{BB962C8B-B14F-4D97-AF65-F5344CB8AC3E}">
-        <p14:creationId xmlns:p14="http://schemas.microsoft.com/office/powerpoint/2010/main" val="2355179620"/>
       </p:ext>
     </p:extLst>
   </p:cSld>

</xml_diff>